<commit_message>
COMMIT BY SARIMs BOT
</commit_message>
<xml_diff>
--- a/49 Graphs/graph.pptx
+++ b/49 Graphs/graph.pptx
@@ -4,6 +4,9 @@
   <p:sldMasterIdLst>
     <p:sldMasterId id="2147483648" r:id="rId1"/>
   </p:sldMasterIdLst>
+  <p:notesMasterIdLst>
+    <p:notesMasterId r:id="rId16"/>
+  </p:notesMasterIdLst>
   <p:sldIdLst>
     <p:sldId id="256" r:id="rId2"/>
     <p:sldId id="257" r:id="rId3"/>
@@ -14,6 +17,11 @@
     <p:sldId id="262" r:id="rId8"/>
     <p:sldId id="263" r:id="rId9"/>
     <p:sldId id="264" r:id="rId10"/>
+    <p:sldId id="265" r:id="rId11"/>
+    <p:sldId id="266" r:id="rId12"/>
+    <p:sldId id="267" r:id="rId13"/>
+    <p:sldId id="268" r:id="rId14"/>
+    <p:sldId id="269" r:id="rId15"/>
   </p:sldIdLst>
   <p:sldSz cx="12192000" cy="6858000"/>
   <p:notesSz cx="6858000" cy="9144000"/>
@@ -112,7 +120,446 @@
       </a:defRPr>
     </a:lvl9pPr>
   </p:defaultTextStyle>
+  <p:extLst>
+    <p:ext uri="{EFAFB233-063F-42B5-8137-9DF3F51BA10A}">
+      <p15:sldGuideLst xmlns:p15="http://schemas.microsoft.com/office/powerpoint/2012/main"/>
+    </p:ext>
+  </p:extLst>
 </p:presentation>
+</file>
+
+<file path=ppt/notesMasters/notesMaster1.xml><?xml version="1.0" encoding="utf-8"?>
+<p:notesMaster xmlns:a="http://schemas.openxmlformats.org/drawingml/2006/main" xmlns:r="http://schemas.openxmlformats.org/officeDocument/2006/relationships" xmlns:p="http://schemas.openxmlformats.org/presentationml/2006/main">
+  <p:cSld>
+    <p:bg>
+      <p:bgRef idx="1001">
+        <a:schemeClr val="bg1"/>
+      </p:bgRef>
+    </p:bg>
+    <p:spTree>
+      <p:nvGrpSpPr>
+        <p:cNvPr id="1" name=""/>
+        <p:cNvGrpSpPr/>
+        <p:nvPr/>
+      </p:nvGrpSpPr>
+      <p:grpSpPr>
+        <a:xfrm>
+          <a:off x="0" y="0"/>
+          <a:ext cx="0" cy="0"/>
+          <a:chOff x="0" y="0"/>
+          <a:chExt cx="0" cy="0"/>
+        </a:xfrm>
+      </p:grpSpPr>
+      <p:sp>
+        <p:nvSpPr>
+          <p:cNvPr id="2" name="Header Placeholder 1"/>
+          <p:cNvSpPr>
+            <a:spLocks noGrp="1"/>
+          </p:cNvSpPr>
+          <p:nvPr>
+            <p:ph type="hdr" sz="quarter"/>
+          </p:nvPr>
+        </p:nvSpPr>
+        <p:spPr>
+          <a:xfrm>
+            <a:off x="0" y="0"/>
+            <a:ext cx="2971800" cy="458788"/>
+          </a:xfrm>
+          <a:prstGeom prst="rect">
+            <a:avLst/>
+          </a:prstGeom>
+        </p:spPr>
+        <p:txBody>
+          <a:bodyPr vert="horz" lIns="91440" tIns="45720" rIns="91440" bIns="45720" rtlCol="0"/>
+          <a:lstStyle>
+            <a:lvl1pPr algn="l">
+              <a:defRPr sz="1200"/>
+            </a:lvl1pPr>
+          </a:lstStyle>
+          <a:p>
+            <a:endParaRPr lang="en-US"/>
+          </a:p>
+        </p:txBody>
+      </p:sp>
+      <p:sp>
+        <p:nvSpPr>
+          <p:cNvPr id="3" name="Date Placeholder 2"/>
+          <p:cNvSpPr>
+            <a:spLocks noGrp="1"/>
+          </p:cNvSpPr>
+          <p:nvPr>
+            <p:ph type="dt" idx="1"/>
+          </p:nvPr>
+        </p:nvSpPr>
+        <p:spPr>
+          <a:xfrm>
+            <a:off x="3884613" y="0"/>
+            <a:ext cx="2971800" cy="458788"/>
+          </a:xfrm>
+          <a:prstGeom prst="rect">
+            <a:avLst/>
+          </a:prstGeom>
+        </p:spPr>
+        <p:txBody>
+          <a:bodyPr vert="horz" lIns="91440" tIns="45720" rIns="91440" bIns="45720" rtlCol="0"/>
+          <a:lstStyle>
+            <a:lvl1pPr algn="r">
+              <a:defRPr sz="1200"/>
+            </a:lvl1pPr>
+          </a:lstStyle>
+          <a:p>
+            <a:fld id="{936A4628-F720-4A76-9D7B-479B9E33EDD5}" type="datetimeFigureOut">
+              <a:rPr lang="en-US" smtClean="0"/>
+              <a:t>17-Nov-20</a:t>
+            </a:fld>
+            <a:endParaRPr lang="en-US"/>
+          </a:p>
+        </p:txBody>
+      </p:sp>
+      <p:sp>
+        <p:nvSpPr>
+          <p:cNvPr id="4" name="Slide Image Placeholder 3"/>
+          <p:cNvSpPr>
+            <a:spLocks noGrp="1" noRot="1" noChangeAspect="1"/>
+          </p:cNvSpPr>
+          <p:nvPr>
+            <p:ph type="sldImg" idx="2"/>
+          </p:nvPr>
+        </p:nvSpPr>
+        <p:spPr>
+          <a:xfrm>
+            <a:off x="685800" y="1143000"/>
+            <a:ext cx="5486400" cy="3086100"/>
+          </a:xfrm>
+          <a:prstGeom prst="rect">
+            <a:avLst/>
+          </a:prstGeom>
+          <a:noFill/>
+          <a:ln w="12700">
+            <a:solidFill>
+              <a:prstClr val="black"/>
+            </a:solidFill>
+          </a:ln>
+        </p:spPr>
+        <p:txBody>
+          <a:bodyPr vert="horz" lIns="91440" tIns="45720" rIns="91440" bIns="45720" rtlCol="0" anchor="ctr"/>
+          <a:lstStyle/>
+          <a:p>
+            <a:endParaRPr lang="en-US"/>
+          </a:p>
+        </p:txBody>
+      </p:sp>
+      <p:sp>
+        <p:nvSpPr>
+          <p:cNvPr id="5" name="Notes Placeholder 4"/>
+          <p:cNvSpPr>
+            <a:spLocks noGrp="1"/>
+          </p:cNvSpPr>
+          <p:nvPr>
+            <p:ph type="body" sz="quarter" idx="3"/>
+          </p:nvPr>
+        </p:nvSpPr>
+        <p:spPr>
+          <a:xfrm>
+            <a:off x="685800" y="4400550"/>
+            <a:ext cx="5486400" cy="3600450"/>
+          </a:xfrm>
+          <a:prstGeom prst="rect">
+            <a:avLst/>
+          </a:prstGeom>
+        </p:spPr>
+        <p:txBody>
+          <a:bodyPr vert="horz" lIns="91440" tIns="45720" rIns="91440" bIns="45720" rtlCol="0"/>
+          <a:lstStyle/>
+          <a:p>
+            <a:pPr lvl="0"/>
+            <a:r>
+              <a:rPr lang="en-US" smtClean="0"/>
+              <a:t>Click to edit Master text styles</a:t>
+            </a:r>
+          </a:p>
+          <a:p>
+            <a:pPr lvl="1"/>
+            <a:r>
+              <a:rPr lang="en-US" smtClean="0"/>
+              <a:t>Second level</a:t>
+            </a:r>
+          </a:p>
+          <a:p>
+            <a:pPr lvl="2"/>
+            <a:r>
+              <a:rPr lang="en-US" smtClean="0"/>
+              <a:t>Third level</a:t>
+            </a:r>
+          </a:p>
+          <a:p>
+            <a:pPr lvl="3"/>
+            <a:r>
+              <a:rPr lang="en-US" smtClean="0"/>
+              <a:t>Fourth level</a:t>
+            </a:r>
+          </a:p>
+          <a:p>
+            <a:pPr lvl="4"/>
+            <a:r>
+              <a:rPr lang="en-US" smtClean="0"/>
+              <a:t>Fifth level</a:t>
+            </a:r>
+            <a:endParaRPr lang="en-US"/>
+          </a:p>
+        </p:txBody>
+      </p:sp>
+      <p:sp>
+        <p:nvSpPr>
+          <p:cNvPr id="6" name="Footer Placeholder 5"/>
+          <p:cNvSpPr>
+            <a:spLocks noGrp="1"/>
+          </p:cNvSpPr>
+          <p:nvPr>
+            <p:ph type="ftr" sz="quarter" idx="4"/>
+          </p:nvPr>
+        </p:nvSpPr>
+        <p:spPr>
+          <a:xfrm>
+            <a:off x="0" y="8685213"/>
+            <a:ext cx="2971800" cy="458787"/>
+          </a:xfrm>
+          <a:prstGeom prst="rect">
+            <a:avLst/>
+          </a:prstGeom>
+        </p:spPr>
+        <p:txBody>
+          <a:bodyPr vert="horz" lIns="91440" tIns="45720" rIns="91440" bIns="45720" rtlCol="0" anchor="b"/>
+          <a:lstStyle>
+            <a:lvl1pPr algn="l">
+              <a:defRPr sz="1200"/>
+            </a:lvl1pPr>
+          </a:lstStyle>
+          <a:p>
+            <a:endParaRPr lang="en-US"/>
+          </a:p>
+        </p:txBody>
+      </p:sp>
+      <p:sp>
+        <p:nvSpPr>
+          <p:cNvPr id="7" name="Slide Number Placeholder 6"/>
+          <p:cNvSpPr>
+            <a:spLocks noGrp="1"/>
+          </p:cNvSpPr>
+          <p:nvPr>
+            <p:ph type="sldNum" sz="quarter" idx="5"/>
+          </p:nvPr>
+        </p:nvSpPr>
+        <p:spPr>
+          <a:xfrm>
+            <a:off x="3884613" y="8685213"/>
+            <a:ext cx="2971800" cy="458787"/>
+          </a:xfrm>
+          <a:prstGeom prst="rect">
+            <a:avLst/>
+          </a:prstGeom>
+        </p:spPr>
+        <p:txBody>
+          <a:bodyPr vert="horz" lIns="91440" tIns="45720" rIns="91440" bIns="45720" rtlCol="0" anchor="b"/>
+          <a:lstStyle>
+            <a:lvl1pPr algn="r">
+              <a:defRPr sz="1200"/>
+            </a:lvl1pPr>
+          </a:lstStyle>
+          <a:p>
+            <a:fld id="{679C88CD-DE7F-41CE-A54F-146FDF32A6C1}" type="slidenum">
+              <a:rPr lang="en-US" smtClean="0"/>
+              <a:t>‹#›</a:t>
+            </a:fld>
+            <a:endParaRPr lang="en-US"/>
+          </a:p>
+        </p:txBody>
+      </p:sp>
+    </p:spTree>
+    <p:extLst>
+      <p:ext uri="{BB962C8B-B14F-4D97-AF65-F5344CB8AC3E}">
+        <p14:creationId xmlns:p14="http://schemas.microsoft.com/office/powerpoint/2010/main" val="2977975686"/>
+      </p:ext>
+    </p:extLst>
+  </p:cSld>
+  <p:clrMap bg1="lt1" tx1="dk1" bg2="lt2" tx2="dk2" accent1="accent1" accent2="accent2" accent3="accent3" accent4="accent4" accent5="accent5" accent6="accent6" hlink="hlink" folHlink="folHlink"/>
+  <p:notesStyle>
+    <a:lvl1pPr marL="0" algn="l" defTabSz="914400" rtl="0" eaLnBrk="1" latinLnBrk="0" hangingPunct="1">
+      <a:defRPr sz="1200" kern="1200">
+        <a:solidFill>
+          <a:schemeClr val="tx1"/>
+        </a:solidFill>
+        <a:latin typeface="+mn-lt"/>
+        <a:ea typeface="+mn-ea"/>
+        <a:cs typeface="+mn-cs"/>
+      </a:defRPr>
+    </a:lvl1pPr>
+    <a:lvl2pPr marL="457200" algn="l" defTabSz="914400" rtl="0" eaLnBrk="1" latinLnBrk="0" hangingPunct="1">
+      <a:defRPr sz="1200" kern="1200">
+        <a:solidFill>
+          <a:schemeClr val="tx1"/>
+        </a:solidFill>
+        <a:latin typeface="+mn-lt"/>
+        <a:ea typeface="+mn-ea"/>
+        <a:cs typeface="+mn-cs"/>
+      </a:defRPr>
+    </a:lvl2pPr>
+    <a:lvl3pPr marL="914400" algn="l" defTabSz="914400" rtl="0" eaLnBrk="1" latinLnBrk="0" hangingPunct="1">
+      <a:defRPr sz="1200" kern="1200">
+        <a:solidFill>
+          <a:schemeClr val="tx1"/>
+        </a:solidFill>
+        <a:latin typeface="+mn-lt"/>
+        <a:ea typeface="+mn-ea"/>
+        <a:cs typeface="+mn-cs"/>
+      </a:defRPr>
+    </a:lvl3pPr>
+    <a:lvl4pPr marL="1371600" algn="l" defTabSz="914400" rtl="0" eaLnBrk="1" latinLnBrk="0" hangingPunct="1">
+      <a:defRPr sz="1200" kern="1200">
+        <a:solidFill>
+          <a:schemeClr val="tx1"/>
+        </a:solidFill>
+        <a:latin typeface="+mn-lt"/>
+        <a:ea typeface="+mn-ea"/>
+        <a:cs typeface="+mn-cs"/>
+      </a:defRPr>
+    </a:lvl4pPr>
+    <a:lvl5pPr marL="1828800" algn="l" defTabSz="914400" rtl="0" eaLnBrk="1" latinLnBrk="0" hangingPunct="1">
+      <a:defRPr sz="1200" kern="1200">
+        <a:solidFill>
+          <a:schemeClr val="tx1"/>
+        </a:solidFill>
+        <a:latin typeface="+mn-lt"/>
+        <a:ea typeface="+mn-ea"/>
+        <a:cs typeface="+mn-cs"/>
+      </a:defRPr>
+    </a:lvl5pPr>
+    <a:lvl6pPr marL="2286000" algn="l" defTabSz="914400" rtl="0" eaLnBrk="1" latinLnBrk="0" hangingPunct="1">
+      <a:defRPr sz="1200" kern="1200">
+        <a:solidFill>
+          <a:schemeClr val="tx1"/>
+        </a:solidFill>
+        <a:latin typeface="+mn-lt"/>
+        <a:ea typeface="+mn-ea"/>
+        <a:cs typeface="+mn-cs"/>
+      </a:defRPr>
+    </a:lvl6pPr>
+    <a:lvl7pPr marL="2743200" algn="l" defTabSz="914400" rtl="0" eaLnBrk="1" latinLnBrk="0" hangingPunct="1">
+      <a:defRPr sz="1200" kern="1200">
+        <a:solidFill>
+          <a:schemeClr val="tx1"/>
+        </a:solidFill>
+        <a:latin typeface="+mn-lt"/>
+        <a:ea typeface="+mn-ea"/>
+        <a:cs typeface="+mn-cs"/>
+      </a:defRPr>
+    </a:lvl7pPr>
+    <a:lvl8pPr marL="3200400" algn="l" defTabSz="914400" rtl="0" eaLnBrk="1" latinLnBrk="0" hangingPunct="1">
+      <a:defRPr sz="1200" kern="1200">
+        <a:solidFill>
+          <a:schemeClr val="tx1"/>
+        </a:solidFill>
+        <a:latin typeface="+mn-lt"/>
+        <a:ea typeface="+mn-ea"/>
+        <a:cs typeface="+mn-cs"/>
+      </a:defRPr>
+    </a:lvl8pPr>
+    <a:lvl9pPr marL="3657600" algn="l" defTabSz="914400" rtl="0" eaLnBrk="1" latinLnBrk="0" hangingPunct="1">
+      <a:defRPr sz="1200" kern="1200">
+        <a:solidFill>
+          <a:schemeClr val="tx1"/>
+        </a:solidFill>
+        <a:latin typeface="+mn-lt"/>
+        <a:ea typeface="+mn-ea"/>
+        <a:cs typeface="+mn-cs"/>
+      </a:defRPr>
+    </a:lvl9pPr>
+  </p:notesStyle>
+</p:notesMaster>
+</file>
+
+<file path=ppt/notesSlides/notesSlide1.xml><?xml version="1.0" encoding="utf-8"?>
+<p:notes xmlns:a="http://schemas.openxmlformats.org/drawingml/2006/main" xmlns:r="http://schemas.openxmlformats.org/officeDocument/2006/relationships" xmlns:p="http://schemas.openxmlformats.org/presentationml/2006/main">
+  <p:cSld>
+    <p:spTree>
+      <p:nvGrpSpPr>
+        <p:cNvPr id="1" name=""/>
+        <p:cNvGrpSpPr/>
+        <p:nvPr/>
+      </p:nvGrpSpPr>
+      <p:grpSpPr>
+        <a:xfrm>
+          <a:off x="0" y="0"/>
+          <a:ext cx="0" cy="0"/>
+          <a:chOff x="0" y="0"/>
+          <a:chExt cx="0" cy="0"/>
+        </a:xfrm>
+      </p:grpSpPr>
+      <p:sp>
+        <p:nvSpPr>
+          <p:cNvPr id="2" name="Slide Image Placeholder 1"/>
+          <p:cNvSpPr>
+            <a:spLocks noGrp="1" noRot="1" noChangeAspect="1"/>
+          </p:cNvSpPr>
+          <p:nvPr>
+            <p:ph type="sldImg"/>
+          </p:nvPr>
+        </p:nvSpPr>
+        <p:spPr/>
+      </p:sp>
+      <p:sp>
+        <p:nvSpPr>
+          <p:cNvPr id="3" name="Notes Placeholder 2"/>
+          <p:cNvSpPr>
+            <a:spLocks noGrp="1"/>
+          </p:cNvSpPr>
+          <p:nvPr>
+            <p:ph type="body" idx="1"/>
+          </p:nvPr>
+        </p:nvSpPr>
+        <p:spPr/>
+        <p:txBody>
+          <a:bodyPr/>
+          <a:lstStyle/>
+          <a:p>
+            <a:endParaRPr lang="en-US" dirty="0"/>
+          </a:p>
+        </p:txBody>
+      </p:sp>
+      <p:sp>
+        <p:nvSpPr>
+          <p:cNvPr id="4" name="Slide Number Placeholder 3"/>
+          <p:cNvSpPr>
+            <a:spLocks noGrp="1"/>
+          </p:cNvSpPr>
+          <p:nvPr>
+            <p:ph type="sldNum" sz="quarter" idx="10"/>
+          </p:nvPr>
+        </p:nvSpPr>
+        <p:spPr/>
+        <p:txBody>
+          <a:bodyPr/>
+          <a:lstStyle/>
+          <a:p>
+            <a:fld id="{679C88CD-DE7F-41CE-A54F-146FDF32A6C1}" type="slidenum">
+              <a:rPr lang="en-US" smtClean="0"/>
+              <a:t>11</a:t>
+            </a:fld>
+            <a:endParaRPr lang="en-US"/>
+          </a:p>
+        </p:txBody>
+      </p:sp>
+    </p:spTree>
+    <p:extLst>
+      <p:ext uri="{BB962C8B-B14F-4D97-AF65-F5344CB8AC3E}">
+        <p14:creationId xmlns:p14="http://schemas.microsoft.com/office/powerpoint/2010/main" val="3593576250"/>
+      </p:ext>
+    </p:extLst>
+  </p:cSld>
+  <p:clrMapOvr>
+    <a:masterClrMapping/>
+  </p:clrMapOvr>
+</p:notes>
 </file>
 
 <file path=ppt/slideLayouts/slideLayout1.xml><?xml version="1.0" encoding="utf-8"?>
@@ -246,7 +693,7 @@
           <a:p>
             <a:fld id="{B1D9ACF3-C5B7-4BCF-8A19-CFA59C1DBC20}" type="datetimeFigureOut">
               <a:rPr lang="en-US" smtClean="0"/>
-              <a:t>04-Nov-20</a:t>
+              <a:t>11-Nov-20</a:t>
             </a:fld>
             <a:endParaRPr lang="en-US"/>
           </a:p>
@@ -416,7 +863,7 @@
           <a:p>
             <a:fld id="{B1D9ACF3-C5B7-4BCF-8A19-CFA59C1DBC20}" type="datetimeFigureOut">
               <a:rPr lang="en-US" smtClean="0"/>
-              <a:t>04-Nov-20</a:t>
+              <a:t>11-Nov-20</a:t>
             </a:fld>
             <a:endParaRPr lang="en-US"/>
           </a:p>
@@ -596,7 +1043,7 @@
           <a:p>
             <a:fld id="{B1D9ACF3-C5B7-4BCF-8A19-CFA59C1DBC20}" type="datetimeFigureOut">
               <a:rPr lang="en-US" smtClean="0"/>
-              <a:t>04-Nov-20</a:t>
+              <a:t>11-Nov-20</a:t>
             </a:fld>
             <a:endParaRPr lang="en-US"/>
           </a:p>
@@ -766,7 +1213,7 @@
           <a:p>
             <a:fld id="{B1D9ACF3-C5B7-4BCF-8A19-CFA59C1DBC20}" type="datetimeFigureOut">
               <a:rPr lang="en-US" smtClean="0"/>
-              <a:t>04-Nov-20</a:t>
+              <a:t>11-Nov-20</a:t>
             </a:fld>
             <a:endParaRPr lang="en-US"/>
           </a:p>
@@ -1012,7 +1459,7 @@
           <a:p>
             <a:fld id="{B1D9ACF3-C5B7-4BCF-8A19-CFA59C1DBC20}" type="datetimeFigureOut">
               <a:rPr lang="en-US" smtClean="0"/>
-              <a:t>04-Nov-20</a:t>
+              <a:t>11-Nov-20</a:t>
             </a:fld>
             <a:endParaRPr lang="en-US"/>
           </a:p>
@@ -1244,7 +1691,7 @@
           <a:p>
             <a:fld id="{B1D9ACF3-C5B7-4BCF-8A19-CFA59C1DBC20}" type="datetimeFigureOut">
               <a:rPr lang="en-US" smtClean="0"/>
-              <a:t>04-Nov-20</a:t>
+              <a:t>11-Nov-20</a:t>
             </a:fld>
             <a:endParaRPr lang="en-US"/>
           </a:p>
@@ -1611,7 +2058,7 @@
           <a:p>
             <a:fld id="{B1D9ACF3-C5B7-4BCF-8A19-CFA59C1DBC20}" type="datetimeFigureOut">
               <a:rPr lang="en-US" smtClean="0"/>
-              <a:t>04-Nov-20</a:t>
+              <a:t>11-Nov-20</a:t>
             </a:fld>
             <a:endParaRPr lang="en-US"/>
           </a:p>
@@ -1729,7 +2176,7 @@
           <a:p>
             <a:fld id="{B1D9ACF3-C5B7-4BCF-8A19-CFA59C1DBC20}" type="datetimeFigureOut">
               <a:rPr lang="en-US" smtClean="0"/>
-              <a:t>04-Nov-20</a:t>
+              <a:t>11-Nov-20</a:t>
             </a:fld>
             <a:endParaRPr lang="en-US"/>
           </a:p>
@@ -1824,7 +2271,7 @@
           <a:p>
             <a:fld id="{B1D9ACF3-C5B7-4BCF-8A19-CFA59C1DBC20}" type="datetimeFigureOut">
               <a:rPr lang="en-US" smtClean="0"/>
-              <a:t>04-Nov-20</a:t>
+              <a:t>11-Nov-20</a:t>
             </a:fld>
             <a:endParaRPr lang="en-US"/>
           </a:p>
@@ -2101,7 +2548,7 @@
           <a:p>
             <a:fld id="{B1D9ACF3-C5B7-4BCF-8A19-CFA59C1DBC20}" type="datetimeFigureOut">
               <a:rPr lang="en-US" smtClean="0"/>
-              <a:t>04-Nov-20</a:t>
+              <a:t>11-Nov-20</a:t>
             </a:fld>
             <a:endParaRPr lang="en-US"/>
           </a:p>
@@ -2354,7 +2801,7 @@
           <a:p>
             <a:fld id="{B1D9ACF3-C5B7-4BCF-8A19-CFA59C1DBC20}" type="datetimeFigureOut">
               <a:rPr lang="en-US" smtClean="0"/>
-              <a:t>04-Nov-20</a:t>
+              <a:t>11-Nov-20</a:t>
             </a:fld>
             <a:endParaRPr lang="en-US"/>
           </a:p>
@@ -2567,7 +3014,7 @@
           <a:p>
             <a:fld id="{B1D9ACF3-C5B7-4BCF-8A19-CFA59C1DBC20}" type="datetimeFigureOut">
               <a:rPr lang="en-US" smtClean="0"/>
-              <a:t>04-Nov-20</a:t>
+              <a:t>11-Nov-20</a:t>
             </a:fld>
             <a:endParaRPr lang="en-US"/>
           </a:p>
@@ -3008,16 +3455,545 @@
   </p:clrMapOvr>
   <mc:AlternateContent xmlns:mc="http://schemas.openxmlformats.org/markup-compatibility/2006">
     <mc:Choice xmlns:p14="http://schemas.microsoft.com/office/powerpoint/2010/main" Requires="p14">
-      <p:transition spd="slow">
-        <p14:flash/>
-      </p:transition>
+      <p:transition p14:dur="0"/>
     </mc:Choice>
     <mc:Fallback>
-      <p:transition spd="slow">
-        <p:fade/>
-      </p:transition>
+      <p:transition/>
     </mc:Fallback>
   </mc:AlternateContent>
+  <p:timing>
+    <p:tnLst>
+      <p:par>
+        <p:cTn id="1" dur="indefinite" restart="never" nodeType="tmRoot"/>
+      </p:par>
+    </p:tnLst>
+  </p:timing>
+</p:sld>
+</file>
+
+<file path=ppt/slides/slide10.xml><?xml version="1.0" encoding="utf-8"?>
+<p:sld xmlns:a="http://schemas.openxmlformats.org/drawingml/2006/main" xmlns:r="http://schemas.openxmlformats.org/officeDocument/2006/relationships" xmlns:p="http://schemas.openxmlformats.org/presentationml/2006/main">
+  <p:cSld>
+    <p:spTree>
+      <p:nvGrpSpPr>
+        <p:cNvPr id="1" name=""/>
+        <p:cNvGrpSpPr/>
+        <p:nvPr/>
+      </p:nvGrpSpPr>
+      <p:grpSpPr>
+        <a:xfrm>
+          <a:off x="0" y="0"/>
+          <a:ext cx="0" cy="0"/>
+          <a:chOff x="0" y="0"/>
+          <a:chExt cx="0" cy="0"/>
+        </a:xfrm>
+      </p:grpSpPr>
+    </p:spTree>
+    <p:extLst>
+      <p:ext uri="{BB962C8B-B14F-4D97-AF65-F5344CB8AC3E}">
+        <p14:creationId xmlns:p14="http://schemas.microsoft.com/office/powerpoint/2010/main" val="2115685789"/>
+      </p:ext>
+    </p:extLst>
+  </p:cSld>
+  <p:clrMapOvr>
+    <a:masterClrMapping/>
+  </p:clrMapOvr>
+  <p:timing>
+    <p:tnLst>
+      <p:par>
+        <p:cTn id="1" dur="indefinite" restart="never" nodeType="tmRoot"/>
+      </p:par>
+    </p:tnLst>
+  </p:timing>
+</p:sld>
+</file>
+
+<file path=ppt/slides/slide11.xml><?xml version="1.0" encoding="utf-8"?>
+<p:sld xmlns:a="http://schemas.openxmlformats.org/drawingml/2006/main" xmlns:r="http://schemas.openxmlformats.org/officeDocument/2006/relationships" xmlns:p="http://schemas.openxmlformats.org/presentationml/2006/main">
+  <p:cSld>
+    <p:spTree>
+      <p:nvGrpSpPr>
+        <p:cNvPr id="1" name=""/>
+        <p:cNvGrpSpPr/>
+        <p:nvPr/>
+      </p:nvGrpSpPr>
+      <p:grpSpPr>
+        <a:xfrm>
+          <a:off x="0" y="0"/>
+          <a:ext cx="0" cy="0"/>
+          <a:chOff x="0" y="0"/>
+          <a:chExt cx="0" cy="0"/>
+        </a:xfrm>
+      </p:grpSpPr>
+      <p:pic>
+        <p:nvPicPr>
+          <p:cNvPr id="2" name="Picture 1"/>
+          <p:cNvPicPr>
+            <a:picLocks noChangeAspect="1"/>
+          </p:cNvPicPr>
+          <p:nvPr/>
+        </p:nvPicPr>
+        <p:blipFill>
+          <a:blip r:embed="rId3"/>
+          <a:stretch>
+            <a:fillRect/>
+          </a:stretch>
+        </p:blipFill>
+        <p:spPr>
+          <a:xfrm>
+            <a:off x="-409575" y="-228600"/>
+            <a:ext cx="13011150" cy="7315200"/>
+          </a:xfrm>
+          <a:prstGeom prst="rect">
+            <a:avLst/>
+          </a:prstGeom>
+        </p:spPr>
+      </p:pic>
+      <p:sp>
+        <p:nvSpPr>
+          <p:cNvPr id="3" name="TextBox 2"/>
+          <p:cNvSpPr txBox="1"/>
+          <p:nvPr/>
+        </p:nvSpPr>
+        <p:spPr>
+          <a:xfrm>
+            <a:off x="271463" y="600075"/>
+            <a:ext cx="3300412" cy="769441"/>
+          </a:xfrm>
+          <a:prstGeom prst="rect">
+            <a:avLst/>
+          </a:prstGeom>
+          <a:noFill/>
+        </p:spPr>
+        <p:txBody>
+          <a:bodyPr wrap="square" rtlCol="0">
+            <a:spAutoFit/>
+          </a:bodyPr>
+          <a:lstStyle/>
+          <a:p>
+            <a:r>
+              <a:rPr lang="en-US" sz="4400" b="1" u="sng" dirty="0" smtClean="0">
+                <a:solidFill>
+                  <a:srgbClr val="0070C0"/>
+                </a:solidFill>
+              </a:rPr>
+              <a:t>Bellman Ford</a:t>
+            </a:r>
+            <a:endParaRPr lang="en-US" sz="4400" b="1" u="sng" dirty="0">
+              <a:solidFill>
+                <a:srgbClr val="0070C0"/>
+              </a:solidFill>
+            </a:endParaRPr>
+          </a:p>
+        </p:txBody>
+      </p:sp>
+      <p:sp>
+        <p:nvSpPr>
+          <p:cNvPr id="4" name="TextBox 3"/>
+          <p:cNvSpPr txBox="1"/>
+          <p:nvPr/>
+        </p:nvSpPr>
+        <p:spPr>
+          <a:xfrm>
+            <a:off x="2986088" y="2500313"/>
+            <a:ext cx="1070678" cy="369332"/>
+          </a:xfrm>
+          <a:prstGeom prst="rect">
+            <a:avLst/>
+          </a:prstGeom>
+          <a:noFill/>
+        </p:spPr>
+        <p:txBody>
+          <a:bodyPr wrap="none" rtlCol="0">
+            <a:spAutoFit/>
+          </a:bodyPr>
+          <a:lstStyle/>
+          <a:p>
+            <a:r>
+              <a:rPr lang="en-US" dirty="0" smtClean="0">
+                <a:solidFill>
+                  <a:srgbClr val="0070C0"/>
+                </a:solidFill>
+              </a:rPr>
+              <a:t>Interview</a:t>
+            </a:r>
+            <a:endParaRPr lang="en-US" dirty="0">
+              <a:solidFill>
+                <a:srgbClr val="0070C0"/>
+              </a:solidFill>
+            </a:endParaRPr>
+          </a:p>
+        </p:txBody>
+      </p:sp>
+      <p:sp>
+        <p:nvSpPr>
+          <p:cNvPr id="5" name="TextBox 4"/>
+          <p:cNvSpPr txBox="1"/>
+          <p:nvPr/>
+        </p:nvSpPr>
+        <p:spPr>
+          <a:xfrm>
+            <a:off x="6096000" y="2130981"/>
+            <a:ext cx="1070678" cy="369332"/>
+          </a:xfrm>
+          <a:prstGeom prst="rect">
+            <a:avLst/>
+          </a:prstGeom>
+          <a:noFill/>
+        </p:spPr>
+        <p:txBody>
+          <a:bodyPr wrap="none" rtlCol="0">
+            <a:spAutoFit/>
+          </a:bodyPr>
+          <a:lstStyle/>
+          <a:p>
+            <a:r>
+              <a:rPr lang="en-US" dirty="0" smtClean="0">
+                <a:solidFill>
+                  <a:srgbClr val="0070C0"/>
+                </a:solidFill>
+              </a:rPr>
+              <a:t>Interview</a:t>
+            </a:r>
+            <a:endParaRPr lang="en-US" dirty="0">
+              <a:solidFill>
+                <a:srgbClr val="0070C0"/>
+              </a:solidFill>
+            </a:endParaRPr>
+          </a:p>
+        </p:txBody>
+      </p:sp>
+      <p:sp>
+        <p:nvSpPr>
+          <p:cNvPr id="6" name="Rectangle 5"/>
+          <p:cNvSpPr/>
+          <p:nvPr/>
+        </p:nvSpPr>
+        <p:spPr>
+          <a:xfrm>
+            <a:off x="3400425" y="6415088"/>
+            <a:ext cx="1600200" cy="442912"/>
+          </a:xfrm>
+          <a:prstGeom prst="rect">
+            <a:avLst/>
+          </a:prstGeom>
+          <a:noFill/>
+          <a:ln w="38100">
+            <a:solidFill>
+              <a:srgbClr val="FF0000"/>
+            </a:solidFill>
+          </a:ln>
+        </p:spPr>
+        <p:style>
+          <a:lnRef idx="2">
+            <a:schemeClr val="accent1">
+              <a:shade val="50000"/>
+            </a:schemeClr>
+          </a:lnRef>
+          <a:fillRef idx="1">
+            <a:schemeClr val="accent1"/>
+          </a:fillRef>
+          <a:effectRef idx="0">
+            <a:schemeClr val="accent1"/>
+          </a:effectRef>
+          <a:fontRef idx="minor">
+            <a:schemeClr val="lt1"/>
+          </a:fontRef>
+        </p:style>
+        <p:txBody>
+          <a:bodyPr rtlCol="0" anchor="ctr"/>
+          <a:lstStyle/>
+          <a:p>
+            <a:pPr algn="ctr"/>
+            <a:endParaRPr lang="en-US"/>
+          </a:p>
+        </p:txBody>
+      </p:sp>
+      <p:sp>
+        <p:nvSpPr>
+          <p:cNvPr id="7" name="Rectangle 6"/>
+          <p:cNvSpPr/>
+          <p:nvPr/>
+        </p:nvSpPr>
+        <p:spPr>
+          <a:xfrm>
+            <a:off x="8310562" y="6193632"/>
+            <a:ext cx="1600200" cy="442912"/>
+          </a:xfrm>
+          <a:prstGeom prst="rect">
+            <a:avLst/>
+          </a:prstGeom>
+          <a:noFill/>
+          <a:ln w="38100">
+            <a:solidFill>
+              <a:srgbClr val="FF0000"/>
+            </a:solidFill>
+          </a:ln>
+        </p:spPr>
+        <p:style>
+          <a:lnRef idx="2">
+            <a:schemeClr val="accent1">
+              <a:shade val="50000"/>
+            </a:schemeClr>
+          </a:lnRef>
+          <a:fillRef idx="1">
+            <a:schemeClr val="accent1"/>
+          </a:fillRef>
+          <a:effectRef idx="0">
+            <a:schemeClr val="accent1"/>
+          </a:effectRef>
+          <a:fontRef idx="minor">
+            <a:schemeClr val="lt1"/>
+          </a:fontRef>
+        </p:style>
+        <p:txBody>
+          <a:bodyPr rtlCol="0" anchor="ctr"/>
+          <a:lstStyle/>
+          <a:p>
+            <a:pPr algn="ctr"/>
+            <a:endParaRPr lang="en-US"/>
+          </a:p>
+        </p:txBody>
+      </p:sp>
+      <p:sp>
+        <p:nvSpPr>
+          <p:cNvPr id="8" name="Rectangle 7"/>
+          <p:cNvSpPr/>
+          <p:nvPr/>
+        </p:nvSpPr>
+        <p:spPr>
+          <a:xfrm>
+            <a:off x="6124575" y="6346032"/>
+            <a:ext cx="1600200" cy="442912"/>
+          </a:xfrm>
+          <a:prstGeom prst="rect">
+            <a:avLst/>
+          </a:prstGeom>
+          <a:noFill/>
+          <a:ln w="38100">
+            <a:solidFill>
+              <a:srgbClr val="FF0000"/>
+            </a:solidFill>
+          </a:ln>
+        </p:spPr>
+        <p:style>
+          <a:lnRef idx="2">
+            <a:schemeClr val="accent1">
+              <a:shade val="50000"/>
+            </a:schemeClr>
+          </a:lnRef>
+          <a:fillRef idx="1">
+            <a:schemeClr val="accent1"/>
+          </a:fillRef>
+          <a:effectRef idx="0">
+            <a:schemeClr val="accent1"/>
+          </a:effectRef>
+          <a:fontRef idx="minor">
+            <a:schemeClr val="lt1"/>
+          </a:fontRef>
+        </p:style>
+        <p:txBody>
+          <a:bodyPr rtlCol="0" anchor="ctr"/>
+          <a:lstStyle/>
+          <a:p>
+            <a:pPr algn="ctr"/>
+            <a:endParaRPr lang="en-US"/>
+          </a:p>
+        </p:txBody>
+      </p:sp>
+    </p:spTree>
+    <p:extLst>
+      <p:ext uri="{BB962C8B-B14F-4D97-AF65-F5344CB8AC3E}">
+        <p14:creationId xmlns:p14="http://schemas.microsoft.com/office/powerpoint/2010/main" val="3397760310"/>
+      </p:ext>
+    </p:extLst>
+  </p:cSld>
+  <p:clrMapOvr>
+    <a:masterClrMapping/>
+  </p:clrMapOvr>
+  <p:timing>
+    <p:tnLst>
+      <p:par>
+        <p:cTn id="1" dur="indefinite" restart="never" nodeType="tmRoot"/>
+      </p:par>
+    </p:tnLst>
+  </p:timing>
+</p:sld>
+</file>
+
+<file path=ppt/slides/slide12.xml><?xml version="1.0" encoding="utf-8"?>
+<p:sld xmlns:a="http://schemas.openxmlformats.org/drawingml/2006/main" xmlns:r="http://schemas.openxmlformats.org/officeDocument/2006/relationships" xmlns:p="http://schemas.openxmlformats.org/presentationml/2006/main">
+  <p:cSld>
+    <p:spTree>
+      <p:nvGrpSpPr>
+        <p:cNvPr id="1" name=""/>
+        <p:cNvGrpSpPr/>
+        <p:nvPr/>
+      </p:nvGrpSpPr>
+      <p:grpSpPr>
+        <a:xfrm>
+          <a:off x="0" y="0"/>
+          <a:ext cx="0" cy="0"/>
+          <a:chOff x="0" y="0"/>
+          <a:chExt cx="0" cy="0"/>
+        </a:xfrm>
+      </p:grpSpPr>
+      <p:pic>
+        <p:nvPicPr>
+          <p:cNvPr id="2" name="Picture 1"/>
+          <p:cNvPicPr>
+            <a:picLocks noChangeAspect="1"/>
+          </p:cNvPicPr>
+          <p:nvPr/>
+        </p:nvPicPr>
+        <p:blipFill>
+          <a:blip r:embed="rId2"/>
+          <a:stretch>
+            <a:fillRect/>
+          </a:stretch>
+        </p:blipFill>
+        <p:spPr>
+          <a:xfrm>
+            <a:off x="-409575" y="-228600"/>
+            <a:ext cx="13011150" cy="7315200"/>
+          </a:xfrm>
+          <a:prstGeom prst="rect">
+            <a:avLst/>
+          </a:prstGeom>
+        </p:spPr>
+      </p:pic>
+    </p:spTree>
+    <p:extLst>
+      <p:ext uri="{BB962C8B-B14F-4D97-AF65-F5344CB8AC3E}">
+        <p14:creationId xmlns:p14="http://schemas.microsoft.com/office/powerpoint/2010/main" val="2115326741"/>
+      </p:ext>
+    </p:extLst>
+  </p:cSld>
+  <p:clrMapOvr>
+    <a:masterClrMapping/>
+  </p:clrMapOvr>
+  <p:timing>
+    <p:tnLst>
+      <p:par>
+        <p:cTn id="1" dur="indefinite" restart="never" nodeType="tmRoot"/>
+      </p:par>
+    </p:tnLst>
+  </p:timing>
+</p:sld>
+</file>
+
+<file path=ppt/slides/slide13.xml><?xml version="1.0" encoding="utf-8"?>
+<p:sld xmlns:a="http://schemas.openxmlformats.org/drawingml/2006/main" xmlns:r="http://schemas.openxmlformats.org/officeDocument/2006/relationships" xmlns:p="http://schemas.openxmlformats.org/presentationml/2006/main">
+  <p:cSld>
+    <p:spTree>
+      <p:nvGrpSpPr>
+        <p:cNvPr id="1" name=""/>
+        <p:cNvGrpSpPr/>
+        <p:nvPr/>
+      </p:nvGrpSpPr>
+      <p:grpSpPr>
+        <a:xfrm>
+          <a:off x="0" y="0"/>
+          <a:ext cx="0" cy="0"/>
+          <a:chOff x="0" y="0"/>
+          <a:chExt cx="0" cy="0"/>
+        </a:xfrm>
+      </p:grpSpPr>
+      <p:pic>
+        <p:nvPicPr>
+          <p:cNvPr id="2" name="Picture 1"/>
+          <p:cNvPicPr>
+            <a:picLocks noChangeAspect="1"/>
+          </p:cNvPicPr>
+          <p:nvPr/>
+        </p:nvPicPr>
+        <p:blipFill>
+          <a:blip r:embed="rId2"/>
+          <a:stretch>
+            <a:fillRect/>
+          </a:stretch>
+        </p:blipFill>
+        <p:spPr>
+          <a:xfrm>
+            <a:off x="-409575" y="-228600"/>
+            <a:ext cx="13011150" cy="7315200"/>
+          </a:xfrm>
+          <a:prstGeom prst="rect">
+            <a:avLst/>
+          </a:prstGeom>
+        </p:spPr>
+      </p:pic>
+    </p:spTree>
+    <p:extLst>
+      <p:ext uri="{BB962C8B-B14F-4D97-AF65-F5344CB8AC3E}">
+        <p14:creationId xmlns:p14="http://schemas.microsoft.com/office/powerpoint/2010/main" val="1448921200"/>
+      </p:ext>
+    </p:extLst>
+  </p:cSld>
+  <p:clrMapOvr>
+    <a:masterClrMapping/>
+  </p:clrMapOvr>
+  <p:timing>
+    <p:tnLst>
+      <p:par>
+        <p:cTn id="1" dur="indefinite" restart="never" nodeType="tmRoot"/>
+      </p:par>
+    </p:tnLst>
+  </p:timing>
+</p:sld>
+</file>
+
+<file path=ppt/slides/slide14.xml><?xml version="1.0" encoding="utf-8"?>
+<p:sld xmlns:a="http://schemas.openxmlformats.org/drawingml/2006/main" xmlns:r="http://schemas.openxmlformats.org/officeDocument/2006/relationships" xmlns:p="http://schemas.openxmlformats.org/presentationml/2006/main">
+  <p:cSld>
+    <p:spTree>
+      <p:nvGrpSpPr>
+        <p:cNvPr id="1" name=""/>
+        <p:cNvGrpSpPr/>
+        <p:nvPr/>
+      </p:nvGrpSpPr>
+      <p:grpSpPr>
+        <a:xfrm>
+          <a:off x="0" y="0"/>
+          <a:ext cx="0" cy="0"/>
+          <a:chOff x="0" y="0"/>
+          <a:chExt cx="0" cy="0"/>
+        </a:xfrm>
+      </p:grpSpPr>
+      <p:pic>
+        <p:nvPicPr>
+          <p:cNvPr id="2" name="Picture 1"/>
+          <p:cNvPicPr>
+            <a:picLocks noChangeAspect="1"/>
+          </p:cNvPicPr>
+          <p:nvPr/>
+        </p:nvPicPr>
+        <p:blipFill>
+          <a:blip r:embed="rId2"/>
+          <a:stretch>
+            <a:fillRect/>
+          </a:stretch>
+        </p:blipFill>
+        <p:spPr>
+          <a:xfrm>
+            <a:off x="-409575" y="-228600"/>
+            <a:ext cx="13011150" cy="7315200"/>
+          </a:xfrm>
+          <a:prstGeom prst="rect">
+            <a:avLst/>
+          </a:prstGeom>
+        </p:spPr>
+      </p:pic>
+    </p:spTree>
+    <p:extLst>
+      <p:ext uri="{BB962C8B-B14F-4D97-AF65-F5344CB8AC3E}">
+        <p14:creationId xmlns:p14="http://schemas.microsoft.com/office/powerpoint/2010/main" val="1814162260"/>
+      </p:ext>
+    </p:extLst>
+  </p:cSld>
+  <p:clrMapOvr>
+    <a:masterClrMapping/>
+  </p:clrMapOvr>
   <p:timing>
     <p:tnLst>
       <p:par>
@@ -3087,14 +4063,10 @@
   </p:clrMapOvr>
   <mc:AlternateContent xmlns:mc="http://schemas.openxmlformats.org/markup-compatibility/2006">
     <mc:Choice xmlns:p14="http://schemas.microsoft.com/office/powerpoint/2010/main" Requires="p14">
-      <p:transition spd="slow">
-        <p14:flash/>
-      </p:transition>
+      <p:transition p14:dur="0"/>
     </mc:Choice>
     <mc:Fallback>
-      <p:transition spd="slow">
-        <p:fade/>
-      </p:transition>
+      <p:transition/>
     </mc:Fallback>
   </mc:AlternateContent>
   <p:timing>
@@ -3208,20 +4180,267 @@
   </p:clrMapOvr>
   <mc:AlternateContent xmlns:mc="http://schemas.openxmlformats.org/markup-compatibility/2006">
     <mc:Choice xmlns:p14="http://schemas.microsoft.com/office/powerpoint/2010/main" Requires="p14">
-      <p:transition spd="slow">
-        <p14:flash/>
-      </p:transition>
+      <p:transition p14:dur="0"/>
     </mc:Choice>
     <mc:Fallback>
-      <p:transition spd="slow">
-        <p:fade/>
-      </p:transition>
+      <p:transition/>
     </mc:Fallback>
   </mc:AlternateContent>
   <p:timing>
     <p:tnLst>
       <p:par>
-        <p:cTn id="1" dur="indefinite" restart="never" nodeType="tmRoot"/>
+        <p:cTn id="1" dur="indefinite" restart="never" nodeType="tmRoot">
+          <p:childTnLst>
+            <p:seq concurrent="1" nextAc="seek">
+              <p:cTn id="2" dur="indefinite" nodeType="mainSeq">
+                <p:childTnLst>
+                  <p:par>
+                    <p:cTn id="3" fill="hold">
+                      <p:stCondLst>
+                        <p:cond delay="indefinite"/>
+                      </p:stCondLst>
+                      <p:childTnLst>
+                        <p:par>
+                          <p:cTn id="4" fill="hold">
+                            <p:stCondLst>
+                              <p:cond delay="0"/>
+                            </p:stCondLst>
+                            <p:childTnLst>
+                              <p:par>
+                                <p:cTn id="5" presetID="31" presetClass="entr" presetSubtype="0" fill="hold" nodeType="clickEffect">
+                                  <p:stCondLst>
+                                    <p:cond delay="0"/>
+                                  </p:stCondLst>
+                                  <p:childTnLst>
+                                    <p:set>
+                                      <p:cBhvr>
+                                        <p:cTn id="6" dur="1" fill="hold">
+                                          <p:stCondLst>
+                                            <p:cond delay="0"/>
+                                          </p:stCondLst>
+                                        </p:cTn>
+                                        <p:tgtEl>
+                                          <p:spTgt spid="5"/>
+                                        </p:tgtEl>
+                                        <p:attrNameLst>
+                                          <p:attrName>style.visibility</p:attrName>
+                                        </p:attrNameLst>
+                                      </p:cBhvr>
+                                      <p:to>
+                                        <p:strVal val="visible"/>
+                                      </p:to>
+                                    </p:set>
+                                    <p:anim calcmode="lin" valueType="num">
+                                      <p:cBhvr>
+                                        <p:cTn id="7" dur="1000" fill="hold"/>
+                                        <p:tgtEl>
+                                          <p:spTgt spid="5"/>
+                                        </p:tgtEl>
+                                        <p:attrNameLst>
+                                          <p:attrName>ppt_w</p:attrName>
+                                        </p:attrNameLst>
+                                      </p:cBhvr>
+                                      <p:tavLst>
+                                        <p:tav tm="0">
+                                          <p:val>
+                                            <p:fltVal val="0"/>
+                                          </p:val>
+                                        </p:tav>
+                                        <p:tav tm="100000">
+                                          <p:val>
+                                            <p:strVal val="#ppt_w"/>
+                                          </p:val>
+                                        </p:tav>
+                                      </p:tavLst>
+                                    </p:anim>
+                                    <p:anim calcmode="lin" valueType="num">
+                                      <p:cBhvr>
+                                        <p:cTn id="8" dur="1000" fill="hold"/>
+                                        <p:tgtEl>
+                                          <p:spTgt spid="5"/>
+                                        </p:tgtEl>
+                                        <p:attrNameLst>
+                                          <p:attrName>ppt_h</p:attrName>
+                                        </p:attrNameLst>
+                                      </p:cBhvr>
+                                      <p:tavLst>
+                                        <p:tav tm="0">
+                                          <p:val>
+                                            <p:fltVal val="0"/>
+                                          </p:val>
+                                        </p:tav>
+                                        <p:tav tm="100000">
+                                          <p:val>
+                                            <p:strVal val="#ppt_h"/>
+                                          </p:val>
+                                        </p:tav>
+                                      </p:tavLst>
+                                    </p:anim>
+                                    <p:anim calcmode="lin" valueType="num">
+                                      <p:cBhvr>
+                                        <p:cTn id="9" dur="1000" fill="hold"/>
+                                        <p:tgtEl>
+                                          <p:spTgt spid="5"/>
+                                        </p:tgtEl>
+                                        <p:attrNameLst>
+                                          <p:attrName>style.rotation</p:attrName>
+                                        </p:attrNameLst>
+                                      </p:cBhvr>
+                                      <p:tavLst>
+                                        <p:tav tm="0">
+                                          <p:val>
+                                            <p:fltVal val="90"/>
+                                          </p:val>
+                                        </p:tav>
+                                        <p:tav tm="100000">
+                                          <p:val>
+                                            <p:fltVal val="0"/>
+                                          </p:val>
+                                        </p:tav>
+                                      </p:tavLst>
+                                    </p:anim>
+                                    <p:animEffect transition="in" filter="fade">
+                                      <p:cBhvr>
+                                        <p:cTn id="10" dur="1000"/>
+                                        <p:tgtEl>
+                                          <p:spTgt spid="5"/>
+                                        </p:tgtEl>
+                                      </p:cBhvr>
+                                    </p:animEffect>
+                                  </p:childTnLst>
+                                </p:cTn>
+                              </p:par>
+                            </p:childTnLst>
+                          </p:cTn>
+                        </p:par>
+                      </p:childTnLst>
+                    </p:cTn>
+                  </p:par>
+                  <p:par>
+                    <p:cTn id="11" fill="hold">
+                      <p:stCondLst>
+                        <p:cond delay="indefinite"/>
+                      </p:stCondLst>
+                      <p:childTnLst>
+                        <p:par>
+                          <p:cTn id="12" fill="hold">
+                            <p:stCondLst>
+                              <p:cond delay="0"/>
+                            </p:stCondLst>
+                            <p:childTnLst>
+                              <p:par>
+                                <p:cTn id="13" presetID="16" presetClass="entr" presetSubtype="21" fill="hold" nodeType="clickEffect">
+                                  <p:stCondLst>
+                                    <p:cond delay="0"/>
+                                  </p:stCondLst>
+                                  <p:childTnLst>
+                                    <p:set>
+                                      <p:cBhvr>
+                                        <p:cTn id="14" dur="1" fill="hold">
+                                          <p:stCondLst>
+                                            <p:cond delay="0"/>
+                                          </p:stCondLst>
+                                        </p:cTn>
+                                        <p:tgtEl>
+                                          <p:spTgt spid="6"/>
+                                        </p:tgtEl>
+                                        <p:attrNameLst>
+                                          <p:attrName>style.visibility</p:attrName>
+                                        </p:attrNameLst>
+                                      </p:cBhvr>
+                                      <p:to>
+                                        <p:strVal val="visible"/>
+                                      </p:to>
+                                    </p:set>
+                                    <p:animEffect transition="in" filter="barn(inVertical)">
+                                      <p:cBhvr>
+                                        <p:cTn id="15" dur="500"/>
+                                        <p:tgtEl>
+                                          <p:spTgt spid="6"/>
+                                        </p:tgtEl>
+                                      </p:cBhvr>
+                                    </p:animEffect>
+                                  </p:childTnLst>
+                                </p:cTn>
+                              </p:par>
+                            </p:childTnLst>
+                          </p:cTn>
+                        </p:par>
+                      </p:childTnLst>
+                    </p:cTn>
+                  </p:par>
+                  <p:par>
+                    <p:cTn id="16" fill="hold">
+                      <p:stCondLst>
+                        <p:cond delay="indefinite"/>
+                      </p:stCondLst>
+                      <p:childTnLst>
+                        <p:par>
+                          <p:cTn id="17" fill="hold">
+                            <p:stCondLst>
+                              <p:cond delay="0"/>
+                            </p:stCondLst>
+                            <p:childTnLst>
+                              <p:par>
+                                <p:cTn id="18" presetID="10" presetClass="entr" presetSubtype="0" fill="hold" nodeType="clickEffect">
+                                  <p:stCondLst>
+                                    <p:cond delay="0"/>
+                                  </p:stCondLst>
+                                  <p:childTnLst>
+                                    <p:set>
+                                      <p:cBhvr>
+                                        <p:cTn id="19" dur="1" fill="hold">
+                                          <p:stCondLst>
+                                            <p:cond delay="0"/>
+                                          </p:stCondLst>
+                                        </p:cTn>
+                                        <p:tgtEl>
+                                          <p:spTgt spid="7"/>
+                                        </p:tgtEl>
+                                        <p:attrNameLst>
+                                          <p:attrName>style.visibility</p:attrName>
+                                        </p:attrNameLst>
+                                      </p:cBhvr>
+                                      <p:to>
+                                        <p:strVal val="visible"/>
+                                      </p:to>
+                                    </p:set>
+                                    <p:animEffect transition="in" filter="fade">
+                                      <p:cBhvr>
+                                        <p:cTn id="20" dur="500"/>
+                                        <p:tgtEl>
+                                          <p:spTgt spid="7"/>
+                                        </p:tgtEl>
+                                      </p:cBhvr>
+                                    </p:animEffect>
+                                  </p:childTnLst>
+                                </p:cTn>
+                              </p:par>
+                            </p:childTnLst>
+                          </p:cTn>
+                        </p:par>
+                      </p:childTnLst>
+                    </p:cTn>
+                  </p:par>
+                </p:childTnLst>
+              </p:cTn>
+              <p:prevCondLst>
+                <p:cond evt="onPrev" delay="0">
+                  <p:tgtEl>
+                    <p:sldTgt/>
+                  </p:tgtEl>
+                </p:cond>
+              </p:prevCondLst>
+              <p:nextCondLst>
+                <p:cond evt="onNext" delay="0">
+                  <p:tgtEl>
+                    <p:sldTgt/>
+                  </p:tgtEl>
+                </p:cond>
+              </p:nextCondLst>
+            </p:seq>
+          </p:childTnLst>
+        </p:cTn>
       </p:par>
     </p:tnLst>
   </p:timing>
@@ -3331,14 +4550,10 @@
   </p:clrMapOvr>
   <mc:AlternateContent xmlns:mc="http://schemas.openxmlformats.org/markup-compatibility/2006">
     <mc:Choice xmlns:p14="http://schemas.microsoft.com/office/powerpoint/2010/main" Requires="p14">
-      <p:transition spd="slow">
-        <p14:flash/>
-      </p:transition>
+      <p:transition p14:dur="0"/>
     </mc:Choice>
     <mc:Fallback>
-      <p:transition spd="slow">
-        <p:fade/>
-      </p:transition>
+      <p:transition/>
     </mc:Fallback>
   </mc:AlternateContent>
   <p:timing>
@@ -3454,14 +4669,10 @@
   </p:clrMapOvr>
   <mc:AlternateContent xmlns:mc="http://schemas.openxmlformats.org/markup-compatibility/2006">
     <mc:Choice xmlns:p14="http://schemas.microsoft.com/office/powerpoint/2010/main" Requires="p14">
-      <p:transition spd="slow">
-        <p14:flash/>
-      </p:transition>
+      <p:transition p14:dur="0"/>
     </mc:Choice>
     <mc:Fallback>
-      <p:transition spd="slow">
-        <p:fade/>
-      </p:transition>
+      <p:transition/>
     </mc:Fallback>
   </mc:AlternateContent>
   <p:timing>
@@ -3623,14 +4834,10 @@
   </p:clrMapOvr>
   <mc:AlternateContent xmlns:mc="http://schemas.openxmlformats.org/markup-compatibility/2006">
     <mc:Choice xmlns:p14="http://schemas.microsoft.com/office/powerpoint/2010/main" Requires="p14">
-      <p:transition spd="slow">
-        <p14:flash/>
-      </p:transition>
+      <p:transition p14:dur="0"/>
     </mc:Choice>
     <mc:Fallback>
-      <p:transition spd="slow">
-        <p:fade/>
-      </p:transition>
+      <p:transition/>
     </mc:Fallback>
   </mc:AlternateContent>
   <p:timing>
@@ -3696,14 +4903,10 @@
   </p:clrMapOvr>
   <mc:AlternateContent xmlns:mc="http://schemas.openxmlformats.org/markup-compatibility/2006">
     <mc:Choice xmlns:p14="http://schemas.microsoft.com/office/powerpoint/2010/main" Requires="p14">
-      <p:transition spd="slow">
-        <p14:flash/>
-      </p:transition>
+      <p:transition p14:dur="0"/>
     </mc:Choice>
     <mc:Fallback>
-      <p:transition spd="slow">
-        <p:fade/>
-      </p:transition>
+      <p:transition/>
     </mc:Fallback>
   </mc:AlternateContent>
   <p:timing>
@@ -4810,14 +6013,10 @@
   </p:clrMapOvr>
   <mc:AlternateContent xmlns:mc="http://schemas.openxmlformats.org/markup-compatibility/2006">
     <mc:Choice xmlns:p14="http://schemas.microsoft.com/office/powerpoint/2010/main" Requires="p14">
-      <p:transition spd="slow">
-        <p14:flash/>
-      </p:transition>
+      <p:transition p14:dur="0"/>
     </mc:Choice>
     <mc:Fallback>
-      <p:transition spd="slow">
-        <p:fade/>
-      </p:transition>
+      <p:transition/>
     </mc:Fallback>
   </mc:AlternateContent>
   <p:timing>
@@ -5027,14 +6226,10 @@
   </p:clrMapOvr>
   <mc:AlternateContent xmlns:mc="http://schemas.openxmlformats.org/markup-compatibility/2006">
     <mc:Choice xmlns:p14="http://schemas.microsoft.com/office/powerpoint/2010/main" Requires="p14">
-      <p:transition spd="slow">
-        <p14:flash/>
-      </p:transition>
+      <p:transition p14:dur="0"/>
     </mc:Choice>
     <mc:Fallback>
-      <p:transition spd="slow">
-        <p:fade/>
-      </p:transition>
+      <p:transition/>
     </mc:Fallback>
   </mc:AlternateContent>
   <p:timing>
@@ -5306,4 +6501,265 @@
     </a:ext>
   </a:extLst>
 </a:theme>
+</file>
+
+<file path=ppt/theme/theme2.xml><?xml version="1.0" encoding="utf-8"?>
+<a:theme xmlns:a="http://schemas.openxmlformats.org/drawingml/2006/main" name="Office Theme">
+  <a:themeElements>
+    <a:clrScheme name="Office">
+      <a:dk1>
+        <a:sysClr val="windowText" lastClr="000000"/>
+      </a:dk1>
+      <a:lt1>
+        <a:sysClr val="window" lastClr="FFFFFF"/>
+      </a:lt1>
+      <a:dk2>
+        <a:srgbClr val="44546A"/>
+      </a:dk2>
+      <a:lt2>
+        <a:srgbClr val="E7E6E6"/>
+      </a:lt2>
+      <a:accent1>
+        <a:srgbClr val="5B9BD5"/>
+      </a:accent1>
+      <a:accent2>
+        <a:srgbClr val="ED7D31"/>
+      </a:accent2>
+      <a:accent3>
+        <a:srgbClr val="A5A5A5"/>
+      </a:accent3>
+      <a:accent4>
+        <a:srgbClr val="FFC000"/>
+      </a:accent4>
+      <a:accent5>
+        <a:srgbClr val="4472C4"/>
+      </a:accent5>
+      <a:accent6>
+        <a:srgbClr val="70AD47"/>
+      </a:accent6>
+      <a:hlink>
+        <a:srgbClr val="0563C1"/>
+      </a:hlink>
+      <a:folHlink>
+        <a:srgbClr val="954F72"/>
+      </a:folHlink>
+    </a:clrScheme>
+    <a:fontScheme name="Office">
+      <a:majorFont>
+        <a:latin typeface="Calibri Light" panose="020F0302020204030204"/>
+        <a:ea typeface=""/>
+        <a:cs typeface=""/>
+        <a:font script="Jpan" typeface="ＭＳ Ｐゴシック"/>
+        <a:font script="Hang" typeface="맑은 고딕"/>
+        <a:font script="Hans" typeface="宋体"/>
+        <a:font script="Hant" typeface="新細明體"/>
+        <a:font script="Arab" typeface="Times New Roman"/>
+        <a:font script="Hebr" typeface="Times New Roman"/>
+        <a:font script="Thai" typeface="Angsana New"/>
+        <a:font script="Ethi" typeface="Nyala"/>
+        <a:font script="Beng" typeface="Vrinda"/>
+        <a:font script="Gujr" typeface="Shruti"/>
+        <a:font script="Khmr" typeface="MoolBoran"/>
+        <a:font script="Knda" typeface="Tunga"/>
+        <a:font script="Guru" typeface="Raavi"/>
+        <a:font script="Cans" typeface="Euphemia"/>
+        <a:font script="Cher" typeface="Plantagenet Cherokee"/>
+        <a:font script="Yiii" typeface="Microsoft Yi Baiti"/>
+        <a:font script="Tibt" typeface="Microsoft Himalaya"/>
+        <a:font script="Thaa" typeface="MV Boli"/>
+        <a:font script="Deva" typeface="Mangal"/>
+        <a:font script="Telu" typeface="Gautami"/>
+        <a:font script="Taml" typeface="Latha"/>
+        <a:font script="Syrc" typeface="Estrangelo Edessa"/>
+        <a:font script="Orya" typeface="Kalinga"/>
+        <a:font script="Mlym" typeface="Kartika"/>
+        <a:font script="Laoo" typeface="DokChampa"/>
+        <a:font script="Sinh" typeface="Iskoola Pota"/>
+        <a:font script="Mong" typeface="Mongolian Baiti"/>
+        <a:font script="Viet" typeface="Times New Roman"/>
+        <a:font script="Uigh" typeface="Microsoft Uighur"/>
+        <a:font script="Geor" typeface="Sylfaen"/>
+      </a:majorFont>
+      <a:minorFont>
+        <a:latin typeface="Calibri" panose="020F0502020204030204"/>
+        <a:ea typeface=""/>
+        <a:cs typeface=""/>
+        <a:font script="Jpan" typeface="ＭＳ Ｐゴシック"/>
+        <a:font script="Hang" typeface="맑은 고딕"/>
+        <a:font script="Hans" typeface="宋体"/>
+        <a:font script="Hant" typeface="新細明體"/>
+        <a:font script="Arab" typeface="Arial"/>
+        <a:font script="Hebr" typeface="Arial"/>
+        <a:font script="Thai" typeface="Cordia New"/>
+        <a:font script="Ethi" typeface="Nyala"/>
+        <a:font script="Beng" typeface="Vrinda"/>
+        <a:font script="Gujr" typeface="Shruti"/>
+        <a:font script="Khmr" typeface="DaunPenh"/>
+        <a:font script="Knda" typeface="Tunga"/>
+        <a:font script="Guru" typeface="Raavi"/>
+        <a:font script="Cans" typeface="Euphemia"/>
+        <a:font script="Cher" typeface="Plantagenet Cherokee"/>
+        <a:font script="Yiii" typeface="Microsoft Yi Baiti"/>
+        <a:font script="Tibt" typeface="Microsoft Himalaya"/>
+        <a:font script="Thaa" typeface="MV Boli"/>
+        <a:font script="Deva" typeface="Mangal"/>
+        <a:font script="Telu" typeface="Gautami"/>
+        <a:font script="Taml" typeface="Latha"/>
+        <a:font script="Syrc" typeface="Estrangelo Edessa"/>
+        <a:font script="Orya" typeface="Kalinga"/>
+        <a:font script="Mlym" typeface="Kartika"/>
+        <a:font script="Laoo" typeface="DokChampa"/>
+        <a:font script="Sinh" typeface="Iskoola Pota"/>
+        <a:font script="Mong" typeface="Mongolian Baiti"/>
+        <a:font script="Viet" typeface="Arial"/>
+        <a:font script="Uigh" typeface="Microsoft Uighur"/>
+        <a:font script="Geor" typeface="Sylfaen"/>
+      </a:minorFont>
+    </a:fontScheme>
+    <a:fmtScheme name="Office">
+      <a:fillStyleLst>
+        <a:solidFill>
+          <a:schemeClr val="phClr"/>
+        </a:solidFill>
+        <a:gradFill rotWithShape="1">
+          <a:gsLst>
+            <a:gs pos="0">
+              <a:schemeClr val="phClr">
+                <a:lumMod val="110000"/>
+                <a:satMod val="105000"/>
+                <a:tint val="67000"/>
+              </a:schemeClr>
+            </a:gs>
+            <a:gs pos="50000">
+              <a:schemeClr val="phClr">
+                <a:lumMod val="105000"/>
+                <a:satMod val="103000"/>
+                <a:tint val="73000"/>
+              </a:schemeClr>
+            </a:gs>
+            <a:gs pos="100000">
+              <a:schemeClr val="phClr">
+                <a:lumMod val="105000"/>
+                <a:satMod val="109000"/>
+                <a:tint val="81000"/>
+              </a:schemeClr>
+            </a:gs>
+          </a:gsLst>
+          <a:lin ang="5400000" scaled="0"/>
+        </a:gradFill>
+        <a:gradFill rotWithShape="1">
+          <a:gsLst>
+            <a:gs pos="0">
+              <a:schemeClr val="phClr">
+                <a:satMod val="103000"/>
+                <a:lumMod val="102000"/>
+                <a:tint val="94000"/>
+              </a:schemeClr>
+            </a:gs>
+            <a:gs pos="50000">
+              <a:schemeClr val="phClr">
+                <a:satMod val="110000"/>
+                <a:lumMod val="100000"/>
+                <a:shade val="100000"/>
+              </a:schemeClr>
+            </a:gs>
+            <a:gs pos="100000">
+              <a:schemeClr val="phClr">
+                <a:lumMod val="99000"/>
+                <a:satMod val="120000"/>
+                <a:shade val="78000"/>
+              </a:schemeClr>
+            </a:gs>
+          </a:gsLst>
+          <a:lin ang="5400000" scaled="0"/>
+        </a:gradFill>
+      </a:fillStyleLst>
+      <a:lnStyleLst>
+        <a:ln w="6350" cap="flat" cmpd="sng" algn="ctr">
+          <a:solidFill>
+            <a:schemeClr val="phClr"/>
+          </a:solidFill>
+          <a:prstDash val="solid"/>
+          <a:miter lim="800000"/>
+        </a:ln>
+        <a:ln w="12700" cap="flat" cmpd="sng" algn="ctr">
+          <a:solidFill>
+            <a:schemeClr val="phClr"/>
+          </a:solidFill>
+          <a:prstDash val="solid"/>
+          <a:miter lim="800000"/>
+        </a:ln>
+        <a:ln w="19050" cap="flat" cmpd="sng" algn="ctr">
+          <a:solidFill>
+            <a:schemeClr val="phClr"/>
+          </a:solidFill>
+          <a:prstDash val="solid"/>
+          <a:miter lim="800000"/>
+        </a:ln>
+      </a:lnStyleLst>
+      <a:effectStyleLst>
+        <a:effectStyle>
+          <a:effectLst/>
+        </a:effectStyle>
+        <a:effectStyle>
+          <a:effectLst/>
+        </a:effectStyle>
+        <a:effectStyle>
+          <a:effectLst>
+            <a:outerShdw blurRad="57150" dist="19050" dir="5400000" algn="ctr" rotWithShape="0">
+              <a:srgbClr val="000000">
+                <a:alpha val="63000"/>
+              </a:srgbClr>
+            </a:outerShdw>
+          </a:effectLst>
+        </a:effectStyle>
+      </a:effectStyleLst>
+      <a:bgFillStyleLst>
+        <a:solidFill>
+          <a:schemeClr val="phClr"/>
+        </a:solidFill>
+        <a:solidFill>
+          <a:schemeClr val="phClr">
+            <a:tint val="95000"/>
+            <a:satMod val="170000"/>
+          </a:schemeClr>
+        </a:solidFill>
+        <a:gradFill rotWithShape="1">
+          <a:gsLst>
+            <a:gs pos="0">
+              <a:schemeClr val="phClr">
+                <a:tint val="93000"/>
+                <a:satMod val="150000"/>
+                <a:shade val="98000"/>
+                <a:lumMod val="102000"/>
+              </a:schemeClr>
+            </a:gs>
+            <a:gs pos="50000">
+              <a:schemeClr val="phClr">
+                <a:tint val="98000"/>
+                <a:satMod val="130000"/>
+                <a:shade val="90000"/>
+                <a:lumMod val="103000"/>
+              </a:schemeClr>
+            </a:gs>
+            <a:gs pos="100000">
+              <a:schemeClr val="phClr">
+                <a:shade val="63000"/>
+                <a:satMod val="120000"/>
+              </a:schemeClr>
+            </a:gs>
+          </a:gsLst>
+          <a:lin ang="5400000" scaled="0"/>
+        </a:gradFill>
+      </a:bgFillStyleLst>
+    </a:fmtScheme>
+  </a:themeElements>
+  <a:objectDefaults/>
+  <a:extraClrSchemeLst/>
+  <a:extLst>
+    <a:ext uri="{05A4C25C-085E-4340-85A3-A5531E510DB2}">
+      <thm15:themeFamily xmlns:thm15="http://schemas.microsoft.com/office/thememl/2012/main" name="Office Theme" id="{62F939B6-93AF-4DB8-9C6B-D6C7DFDC589F}" vid="{4A3C46E8-61CC-4603-A589-7422A47A8E4A}"/>
+    </a:ext>
+  </a:extLst>
+</a:theme>
 </file>
</xml_diff>